<commit_message>
Added inability to start new game if no data is saved
</commit_message>
<xml_diff>
--- a/University Tycoon.pptx
+++ b/University Tycoon.pptx
@@ -12,10 +12,12 @@
     <p:sldId id="264" r:id="rId6"/>
     <p:sldId id="265" r:id="rId7"/>
     <p:sldId id="266" r:id="rId8"/>
-    <p:sldId id="257" r:id="rId9"/>
-    <p:sldId id="258" r:id="rId10"/>
-    <p:sldId id="260" r:id="rId11"/>
-    <p:sldId id="259" r:id="rId12"/>
+    <p:sldId id="267" r:id="rId9"/>
+    <p:sldId id="268" r:id="rId10"/>
+    <p:sldId id="257" r:id="rId11"/>
+    <p:sldId id="258" r:id="rId12"/>
+    <p:sldId id="260" r:id="rId13"/>
+    <p:sldId id="259" r:id="rId14"/>
   </p:sldIdLst>
   <p:sldSz cx="12192000" cy="6858000"/>
   <p:notesSz cx="6858000" cy="9144000"/>
@@ -7770,6 +7772,180 @@
           <p:cNvPr id="2" name="Title 1">
             <a:extLst>
               <a:ext uri="{FF2B5EF4-FFF2-40B4-BE49-F238E27FC236}">
+                <a16:creationId xmlns:a16="http://schemas.microsoft.com/office/drawing/2014/main" id="{9E504439-D2B8-46A5-8EFE-3EC6F3537A65}"/>
+              </a:ext>
+            </a:extLst>
+          </p:cNvPr>
+          <p:cNvSpPr>
+            <a:spLocks noGrp="1"/>
+          </p:cNvSpPr>
+          <p:nvPr>
+            <p:ph type="title"/>
+          </p:nvPr>
+        </p:nvSpPr>
+        <p:spPr/>
+        <p:txBody>
+          <a:bodyPr/>
+          <a:lstStyle/>
+          <a:p>
+            <a:r>
+              <a:rPr lang="en-US" dirty="0"/>
+              <a:t>Build System Diagram</a:t>
+            </a:r>
+          </a:p>
+        </p:txBody>
+      </p:sp>
+      <p:pic>
+        <p:nvPicPr>
+          <p:cNvPr id="5" name="Content Placeholder 4" descr="A close up of a map&#10;&#10;Description generated with high confidence">
+            <a:extLst>
+              <a:ext uri="{FF2B5EF4-FFF2-40B4-BE49-F238E27FC236}">
+                <a16:creationId xmlns:a16="http://schemas.microsoft.com/office/drawing/2014/main" id="{A411B51E-7360-4074-B98D-695BE7E85994}"/>
+              </a:ext>
+            </a:extLst>
+          </p:cNvPr>
+          <p:cNvPicPr>
+            <a:picLocks noGrp="1" noChangeAspect="1"/>
+          </p:cNvPicPr>
+          <p:nvPr>
+            <p:ph idx="1"/>
+          </p:nvPr>
+        </p:nvPicPr>
+        <p:blipFill>
+          <a:blip r:embed="rId2"/>
+          <a:stretch>
+            <a:fillRect/>
+          </a:stretch>
+        </p:blipFill>
+        <p:spPr>
+          <a:xfrm>
+            <a:off x="2316916" y="2194430"/>
+            <a:ext cx="9875084" cy="3675030"/>
+          </a:xfrm>
+        </p:spPr>
+      </p:pic>
+    </p:spTree>
+    <p:extLst>
+      <p:ext uri="{BB962C8B-B14F-4D97-AF65-F5344CB8AC3E}">
+        <p14:creationId xmlns:p14="http://schemas.microsoft.com/office/powerpoint/2010/main" val="3054545400"/>
+      </p:ext>
+    </p:extLst>
+  </p:cSld>
+  <p:clrMapOvr>
+    <a:masterClrMapping/>
+  </p:clrMapOvr>
+</p:sld>
+</file>
+
+<file path=ppt/slides/slide11.xml><?xml version="1.0" encoding="utf-8"?>
+<p:sld xmlns:a="http://schemas.openxmlformats.org/drawingml/2006/main" xmlns:r="http://schemas.openxmlformats.org/officeDocument/2006/relationships" xmlns:p="http://schemas.openxmlformats.org/presentationml/2006/main">
+  <p:cSld>
+    <p:spTree>
+      <p:nvGrpSpPr>
+        <p:cNvPr id="1" name=""/>
+        <p:cNvGrpSpPr/>
+        <p:nvPr/>
+      </p:nvGrpSpPr>
+      <p:grpSpPr>
+        <a:xfrm>
+          <a:off x="0" y="0"/>
+          <a:ext cx="0" cy="0"/>
+          <a:chOff x="0" y="0"/>
+          <a:chExt cx="0" cy="0"/>
+        </a:xfrm>
+      </p:grpSpPr>
+      <p:sp>
+        <p:nvSpPr>
+          <p:cNvPr id="2" name="Title 1">
+            <a:extLst>
+              <a:ext uri="{FF2B5EF4-FFF2-40B4-BE49-F238E27FC236}">
+                <a16:creationId xmlns:a16="http://schemas.microsoft.com/office/drawing/2014/main" id="{E569CAA4-CAE4-4805-921B-3C311A68908E}"/>
+              </a:ext>
+            </a:extLst>
+          </p:cNvPr>
+          <p:cNvSpPr>
+            <a:spLocks noGrp="1"/>
+          </p:cNvSpPr>
+          <p:nvPr>
+            <p:ph type="title"/>
+          </p:nvPr>
+        </p:nvSpPr>
+        <p:spPr/>
+        <p:txBody>
+          <a:bodyPr/>
+          <a:lstStyle/>
+          <a:p>
+            <a:r>
+              <a:rPr lang="en-US" dirty="0"/>
+              <a:t>Objects Diagram</a:t>
+            </a:r>
+          </a:p>
+        </p:txBody>
+      </p:sp>
+      <p:pic>
+        <p:nvPicPr>
+          <p:cNvPr id="5" name="Content Placeholder 4" descr="A close up of a map&#10;&#10;Description generated with very high confidence">
+            <a:extLst>
+              <a:ext uri="{FF2B5EF4-FFF2-40B4-BE49-F238E27FC236}">
+                <a16:creationId xmlns:a16="http://schemas.microsoft.com/office/drawing/2014/main" id="{A1E9D69E-A280-476D-AD7D-D1F043D3160B}"/>
+              </a:ext>
+            </a:extLst>
+          </p:cNvPr>
+          <p:cNvPicPr>
+            <a:picLocks noGrp="1" noChangeAspect="1"/>
+          </p:cNvPicPr>
+          <p:nvPr>
+            <p:ph idx="1"/>
+          </p:nvPr>
+        </p:nvPicPr>
+        <p:blipFill>
+          <a:blip r:embed="rId2"/>
+          <a:stretch>
+            <a:fillRect/>
+          </a:stretch>
+        </p:blipFill>
+        <p:spPr>
+          <a:xfrm>
+            <a:off x="1489460" y="1905000"/>
+            <a:ext cx="10571809" cy="4165145"/>
+          </a:xfrm>
+        </p:spPr>
+      </p:pic>
+    </p:spTree>
+    <p:extLst>
+      <p:ext uri="{BB962C8B-B14F-4D97-AF65-F5344CB8AC3E}">
+        <p14:creationId xmlns:p14="http://schemas.microsoft.com/office/powerpoint/2010/main" val="734014380"/>
+      </p:ext>
+    </p:extLst>
+  </p:cSld>
+  <p:clrMapOvr>
+    <a:masterClrMapping/>
+  </p:clrMapOvr>
+</p:sld>
+</file>
+
+<file path=ppt/slides/slide12.xml><?xml version="1.0" encoding="utf-8"?>
+<p:sld xmlns:a="http://schemas.openxmlformats.org/drawingml/2006/main" xmlns:r="http://schemas.openxmlformats.org/officeDocument/2006/relationships" xmlns:p="http://schemas.openxmlformats.org/presentationml/2006/main">
+  <p:cSld>
+    <p:spTree>
+      <p:nvGrpSpPr>
+        <p:cNvPr id="1" name=""/>
+        <p:cNvGrpSpPr/>
+        <p:nvPr/>
+      </p:nvGrpSpPr>
+      <p:grpSpPr>
+        <a:xfrm>
+          <a:off x="0" y="0"/>
+          <a:ext cx="0" cy="0"/>
+          <a:chOff x="0" y="0"/>
+          <a:chExt cx="0" cy="0"/>
+        </a:xfrm>
+      </p:grpSpPr>
+      <p:sp>
+        <p:nvSpPr>
+          <p:cNvPr id="2" name="Title 1">
+            <a:extLst>
+              <a:ext uri="{FF2B5EF4-FFF2-40B4-BE49-F238E27FC236}">
                 <a16:creationId xmlns:a16="http://schemas.microsoft.com/office/drawing/2014/main" id="{A7F46A3E-9EE3-470B-9818-97E825A89E22}"/>
               </a:ext>
             </a:extLst>
@@ -7861,7 +8037,7 @@
 </p:sld>
 </file>
 
-<file path=ppt/slides/slide11.xml><?xml version="1.0" encoding="utf-8"?>
+<file path=ppt/slides/slide13.xml><?xml version="1.0" encoding="utf-8"?>
 <p:sld xmlns:a="http://schemas.openxmlformats.org/drawingml/2006/main" xmlns:r="http://schemas.openxmlformats.org/officeDocument/2006/relationships" xmlns:p="http://schemas.openxmlformats.org/presentationml/2006/main">
   <p:cSld>
     <p:bg>
@@ -8957,7 +9133,7 @@
           <p:cNvPr id="2" name="Title 1">
             <a:extLst>
               <a:ext uri="{FF2B5EF4-FFF2-40B4-BE49-F238E27FC236}">
-                <a16:creationId xmlns:a16="http://schemas.microsoft.com/office/drawing/2014/main" id="{9E504439-D2B8-46A5-8EFE-3EC6F3537A65}"/>
+                <a16:creationId xmlns:a16="http://schemas.microsoft.com/office/drawing/2014/main" id="{241988B0-A68B-4E59-8F81-28A4F8211C79}"/>
               </a:ext>
             </a:extLst>
           </p:cNvPr>
@@ -8975,17 +9151,17 @@
           <a:p>
             <a:r>
               <a:rPr lang="en-US" dirty="0"/>
-              <a:t>Build System Diagram</a:t>
+              <a:t>UML – Start Up</a:t>
             </a:r>
           </a:p>
         </p:txBody>
       </p:sp>
       <p:pic>
         <p:nvPicPr>
-          <p:cNvPr id="5" name="Content Placeholder 4" descr="A close up of a map&#10;&#10;Description generated with high confidence">
+          <p:cNvPr id="4" name="Content Placeholder 3">
             <a:extLst>
               <a:ext uri="{FF2B5EF4-FFF2-40B4-BE49-F238E27FC236}">
-                <a16:creationId xmlns:a16="http://schemas.microsoft.com/office/drawing/2014/main" id="{A411B51E-7360-4074-B98D-695BE7E85994}"/>
+                <a16:creationId xmlns:a16="http://schemas.microsoft.com/office/drawing/2014/main" id="{6BC337FF-E963-444F-8A40-33950B8601E4}"/>
               </a:ext>
             </a:extLst>
           </p:cNvPr>
@@ -9004,15 +9180,18 @@
         </p:blipFill>
         <p:spPr>
           <a:xfrm>
-            <a:off x="2316916" y="2194430"/>
-            <a:ext cx="9875084" cy="3675030"/>
+            <a:off x="2521218" y="2266950"/>
+            <a:ext cx="9055100" cy="4425950"/>
           </a:xfrm>
+          <a:prstGeom prst="rect">
+            <a:avLst/>
+          </a:prstGeom>
         </p:spPr>
       </p:pic>
     </p:spTree>
     <p:extLst>
       <p:ext uri="{BB962C8B-B14F-4D97-AF65-F5344CB8AC3E}">
-        <p14:creationId xmlns:p14="http://schemas.microsoft.com/office/powerpoint/2010/main" val="3054545400"/>
+        <p14:creationId xmlns:p14="http://schemas.microsoft.com/office/powerpoint/2010/main" val="1463581966"/>
       </p:ext>
     </p:extLst>
   </p:cSld>
@@ -9044,7 +9223,7 @@
           <p:cNvPr id="2" name="Title 1">
             <a:extLst>
               <a:ext uri="{FF2B5EF4-FFF2-40B4-BE49-F238E27FC236}">
-                <a16:creationId xmlns:a16="http://schemas.microsoft.com/office/drawing/2014/main" id="{E569CAA4-CAE4-4805-921B-3C311A68908E}"/>
+                <a16:creationId xmlns:a16="http://schemas.microsoft.com/office/drawing/2014/main" id="{80606CD3-A638-4B10-A669-787268C2B1B0}"/>
               </a:ext>
             </a:extLst>
           </p:cNvPr>
@@ -9062,17 +9241,17 @@
           <a:p>
             <a:r>
               <a:rPr lang="en-US" dirty="0"/>
-              <a:t>Objects Diagram</a:t>
+              <a:t>Test Cases – Start up</a:t>
             </a:r>
           </a:p>
         </p:txBody>
       </p:sp>
       <p:pic>
         <p:nvPicPr>
-          <p:cNvPr id="5" name="Content Placeholder 4" descr="A close up of a map&#10;&#10;Description generated with very high confidence">
+          <p:cNvPr id="4" name="Content Placeholder 3">
             <a:extLst>
               <a:ext uri="{FF2B5EF4-FFF2-40B4-BE49-F238E27FC236}">
-                <a16:creationId xmlns:a16="http://schemas.microsoft.com/office/drawing/2014/main" id="{A1E9D69E-A280-476D-AD7D-D1F043D3160B}"/>
+                <a16:creationId xmlns:a16="http://schemas.microsoft.com/office/drawing/2014/main" id="{721EF8D1-B444-49BD-B3B0-DAB0B3395C2D}"/>
               </a:ext>
             </a:extLst>
           </p:cNvPr>
@@ -9091,15 +9270,18 @@
         </p:blipFill>
         <p:spPr>
           <a:xfrm>
-            <a:off x="1489460" y="1905000"/>
-            <a:ext cx="10571809" cy="4165145"/>
+            <a:off x="2126518" y="1485900"/>
+            <a:ext cx="7957281" cy="5257800"/>
           </a:xfrm>
+          <a:prstGeom prst="rect">
+            <a:avLst/>
+          </a:prstGeom>
         </p:spPr>
       </p:pic>
     </p:spTree>
     <p:extLst>
       <p:ext uri="{BB962C8B-B14F-4D97-AF65-F5344CB8AC3E}">
-        <p14:creationId xmlns:p14="http://schemas.microsoft.com/office/powerpoint/2010/main" val="734014380"/>
+        <p14:creationId xmlns:p14="http://schemas.microsoft.com/office/powerpoint/2010/main" val="2333415347"/>
       </p:ext>
     </p:extLst>
   </p:cSld>

</xml_diff>